<commit_message>
logistic regression 계속 작성 중
</commit_message>
<xml_diff>
--- a/pics/2020-09-23-logistic_regression/pics.pptx
+++ b/pics/2020-09-23-logistic_regression/pics.pptx
@@ -6,7 +6,8 @@
   </p:sldMasterIdLst>
   <p:sldIdLst>
     <p:sldId id="256" r:id="rId2"/>
-    <p:sldId id="257" r:id="rId3"/>
+    <p:sldId id="258" r:id="rId3"/>
+    <p:sldId id="257" r:id="rId4"/>
   </p:sldIdLst>
   <p:sldSz cx="9144000" cy="6858000" type="screen4x3"/>
   <p:notesSz cx="6858000" cy="9144000"/>
@@ -105,6 +106,22 @@
       </a:defRPr>
     </a:lvl9pPr>
   </p:defaultTextStyle>
+  <p:extLst>
+    <p:ext uri="{EFAFB233-063F-42B5-8137-9DF3F51BA10A}">
+      <p15:sldGuideLst xmlns:p15="http://schemas.microsoft.com/office/powerpoint/2012/main">
+        <p15:guide id="1" orient="horz" pos="2160">
+          <p15:clr>
+            <a:srgbClr val="A4A3A4"/>
+          </p15:clr>
+        </p15:guide>
+        <p15:guide id="2" pos="2880">
+          <p15:clr>
+            <a:srgbClr val="A4A3A4"/>
+          </p15:clr>
+        </p15:guide>
+      </p15:sldGuideLst>
+    </p:ext>
+  </p:extLst>
 </p:presentation>
 </file>
 
@@ -146,10 +163,9 @@
           <a:lstStyle/>
           <a:p>
             <a:r>
-              <a:rPr lang="ko-KR" altLang="en-US" smtClean="0"/>
+              <a:rPr lang="ko-KR" altLang="en-US"/>
               <a:t>마스터 제목 스타일 편집</a:t>
             </a:r>
-            <a:endParaRPr lang="ko-KR" altLang="en-US"/>
           </a:p>
         </p:txBody>
       </p:sp>
@@ -265,10 +281,9 @@
           </a:lstStyle>
           <a:p>
             <a:r>
-              <a:rPr lang="ko-KR" altLang="en-US" smtClean="0"/>
+              <a:rPr lang="ko-KR" altLang="en-US"/>
               <a:t>마스터 부제목 스타일 편집</a:t>
             </a:r>
-            <a:endParaRPr lang="ko-KR" altLang="en-US"/>
           </a:p>
         </p:txBody>
       </p:sp>
@@ -289,7 +304,7 @@
           <a:p>
             <a:fld id="{FB30EDBD-1C2D-4C1E-B459-B60219FAB484}" type="datetimeFigureOut">
               <a:rPr lang="ko-KR" altLang="en-US" smtClean="0"/>
-              <a:t>2020-09-23</a:t>
+              <a:t>2020-09-26</a:t>
             </a:fld>
             <a:endParaRPr lang="ko-KR" altLang="en-US"/>
           </a:p>
@@ -378,10 +393,9 @@
           <a:lstStyle/>
           <a:p>
             <a:r>
-              <a:rPr lang="ko-KR" altLang="en-US" smtClean="0"/>
+              <a:rPr lang="ko-KR" altLang="en-US"/>
               <a:t>마스터 제목 스타일 편집</a:t>
             </a:r>
-            <a:endParaRPr lang="ko-KR" altLang="en-US"/>
           </a:p>
         </p:txBody>
       </p:sp>
@@ -402,38 +416,37 @@
           <a:p>
             <a:pPr lvl="0"/>
             <a:r>
-              <a:rPr lang="ko-KR" altLang="en-US" smtClean="0"/>
+              <a:rPr lang="ko-KR" altLang="en-US"/>
               <a:t>마스터 텍스트 스타일을 편집합니다</a:t>
             </a:r>
           </a:p>
           <a:p>
             <a:pPr lvl="1"/>
             <a:r>
-              <a:rPr lang="ko-KR" altLang="en-US" smtClean="0"/>
+              <a:rPr lang="ko-KR" altLang="en-US"/>
               <a:t>둘째 수준</a:t>
             </a:r>
           </a:p>
           <a:p>
             <a:pPr lvl="2"/>
             <a:r>
-              <a:rPr lang="ko-KR" altLang="en-US" smtClean="0"/>
+              <a:rPr lang="ko-KR" altLang="en-US"/>
               <a:t>셋째 수준</a:t>
             </a:r>
           </a:p>
           <a:p>
             <a:pPr lvl="3"/>
             <a:r>
-              <a:rPr lang="ko-KR" altLang="en-US" smtClean="0"/>
+              <a:rPr lang="ko-KR" altLang="en-US"/>
               <a:t>넷째 수준</a:t>
             </a:r>
           </a:p>
           <a:p>
             <a:pPr lvl="4"/>
             <a:r>
-              <a:rPr lang="ko-KR" altLang="en-US" smtClean="0"/>
+              <a:rPr lang="ko-KR" altLang="en-US"/>
               <a:t>다섯째 수준</a:t>
             </a:r>
-            <a:endParaRPr lang="ko-KR" altLang="en-US"/>
           </a:p>
         </p:txBody>
       </p:sp>
@@ -454,7 +467,7 @@
           <a:p>
             <a:fld id="{FB30EDBD-1C2D-4C1E-B459-B60219FAB484}" type="datetimeFigureOut">
               <a:rPr lang="ko-KR" altLang="en-US" smtClean="0"/>
-              <a:t>2020-09-23</a:t>
+              <a:t>2020-09-26</a:t>
             </a:fld>
             <a:endParaRPr lang="ko-KR" altLang="en-US"/>
           </a:p>
@@ -548,10 +561,9 @@
           <a:lstStyle/>
           <a:p>
             <a:r>
-              <a:rPr lang="ko-KR" altLang="en-US" smtClean="0"/>
+              <a:rPr lang="ko-KR" altLang="en-US"/>
               <a:t>마스터 제목 스타일 편집</a:t>
             </a:r>
-            <a:endParaRPr lang="ko-KR" altLang="en-US"/>
           </a:p>
         </p:txBody>
       </p:sp>
@@ -577,38 +589,37 @@
           <a:p>
             <a:pPr lvl="0"/>
             <a:r>
-              <a:rPr lang="ko-KR" altLang="en-US" smtClean="0"/>
+              <a:rPr lang="ko-KR" altLang="en-US"/>
               <a:t>마스터 텍스트 스타일을 편집합니다</a:t>
             </a:r>
           </a:p>
           <a:p>
             <a:pPr lvl="1"/>
             <a:r>
-              <a:rPr lang="ko-KR" altLang="en-US" smtClean="0"/>
+              <a:rPr lang="ko-KR" altLang="en-US"/>
               <a:t>둘째 수준</a:t>
             </a:r>
           </a:p>
           <a:p>
             <a:pPr lvl="2"/>
             <a:r>
-              <a:rPr lang="ko-KR" altLang="en-US" smtClean="0"/>
+              <a:rPr lang="ko-KR" altLang="en-US"/>
               <a:t>셋째 수준</a:t>
             </a:r>
           </a:p>
           <a:p>
             <a:pPr lvl="3"/>
             <a:r>
-              <a:rPr lang="ko-KR" altLang="en-US" smtClean="0"/>
+              <a:rPr lang="ko-KR" altLang="en-US"/>
               <a:t>넷째 수준</a:t>
             </a:r>
           </a:p>
           <a:p>
             <a:pPr lvl="4"/>
             <a:r>
-              <a:rPr lang="ko-KR" altLang="en-US" smtClean="0"/>
+              <a:rPr lang="ko-KR" altLang="en-US"/>
               <a:t>다섯째 수준</a:t>
             </a:r>
-            <a:endParaRPr lang="ko-KR" altLang="en-US"/>
           </a:p>
         </p:txBody>
       </p:sp>
@@ -629,7 +640,7 @@
           <a:p>
             <a:fld id="{FB30EDBD-1C2D-4C1E-B459-B60219FAB484}" type="datetimeFigureOut">
               <a:rPr lang="ko-KR" altLang="en-US" smtClean="0"/>
-              <a:t>2020-09-23</a:t>
+              <a:t>2020-09-26</a:t>
             </a:fld>
             <a:endParaRPr lang="ko-KR" altLang="en-US"/>
           </a:p>
@@ -718,10 +729,9 @@
           <a:lstStyle/>
           <a:p>
             <a:r>
-              <a:rPr lang="ko-KR" altLang="en-US" smtClean="0"/>
+              <a:rPr lang="ko-KR" altLang="en-US"/>
               <a:t>마스터 제목 스타일 편집</a:t>
             </a:r>
-            <a:endParaRPr lang="ko-KR" altLang="en-US"/>
           </a:p>
         </p:txBody>
       </p:sp>
@@ -742,38 +752,37 @@
           <a:p>
             <a:pPr lvl="0"/>
             <a:r>
-              <a:rPr lang="ko-KR" altLang="en-US" smtClean="0"/>
+              <a:rPr lang="ko-KR" altLang="en-US"/>
               <a:t>마스터 텍스트 스타일을 편집합니다</a:t>
             </a:r>
           </a:p>
           <a:p>
             <a:pPr lvl="1"/>
             <a:r>
-              <a:rPr lang="ko-KR" altLang="en-US" smtClean="0"/>
+              <a:rPr lang="ko-KR" altLang="en-US"/>
               <a:t>둘째 수준</a:t>
             </a:r>
           </a:p>
           <a:p>
             <a:pPr lvl="2"/>
             <a:r>
-              <a:rPr lang="ko-KR" altLang="en-US" smtClean="0"/>
+              <a:rPr lang="ko-KR" altLang="en-US"/>
               <a:t>셋째 수준</a:t>
             </a:r>
           </a:p>
           <a:p>
             <a:pPr lvl="3"/>
             <a:r>
-              <a:rPr lang="ko-KR" altLang="en-US" smtClean="0"/>
+              <a:rPr lang="ko-KR" altLang="en-US"/>
               <a:t>넷째 수준</a:t>
             </a:r>
           </a:p>
           <a:p>
             <a:pPr lvl="4"/>
             <a:r>
-              <a:rPr lang="ko-KR" altLang="en-US" smtClean="0"/>
+              <a:rPr lang="ko-KR" altLang="en-US"/>
               <a:t>다섯째 수준</a:t>
             </a:r>
-            <a:endParaRPr lang="ko-KR" altLang="en-US"/>
           </a:p>
         </p:txBody>
       </p:sp>
@@ -794,7 +803,7 @@
           <a:p>
             <a:fld id="{FB30EDBD-1C2D-4C1E-B459-B60219FAB484}" type="datetimeFigureOut">
               <a:rPr lang="ko-KR" altLang="en-US" smtClean="0"/>
-              <a:t>2020-09-23</a:t>
+              <a:t>2020-09-26</a:t>
             </a:fld>
             <a:endParaRPr lang="ko-KR" altLang="en-US"/>
           </a:p>
@@ -892,10 +901,9 @@
           </a:lstStyle>
           <a:p>
             <a:r>
-              <a:rPr lang="ko-KR" altLang="en-US" smtClean="0"/>
+              <a:rPr lang="ko-KR" altLang="en-US"/>
               <a:t>마스터 제목 스타일 편집</a:t>
             </a:r>
-            <a:endParaRPr lang="ko-KR" altLang="en-US"/>
           </a:p>
         </p:txBody>
       </p:sp>
@@ -1012,7 +1020,7 @@
           <a:p>
             <a:pPr lvl="0"/>
             <a:r>
-              <a:rPr lang="ko-KR" altLang="en-US" smtClean="0"/>
+              <a:rPr lang="ko-KR" altLang="en-US"/>
               <a:t>마스터 텍스트 스타일을 편집합니다</a:t>
             </a:r>
           </a:p>
@@ -1035,7 +1043,7 @@
           <a:p>
             <a:fld id="{FB30EDBD-1C2D-4C1E-B459-B60219FAB484}" type="datetimeFigureOut">
               <a:rPr lang="ko-KR" altLang="en-US" smtClean="0"/>
-              <a:t>2020-09-23</a:t>
+              <a:t>2020-09-26</a:t>
             </a:fld>
             <a:endParaRPr lang="ko-KR" altLang="en-US"/>
           </a:p>
@@ -1124,10 +1132,9 @@
           <a:lstStyle/>
           <a:p>
             <a:r>
-              <a:rPr lang="ko-KR" altLang="en-US" smtClean="0"/>
+              <a:rPr lang="ko-KR" altLang="en-US"/>
               <a:t>마스터 제목 스타일 편집</a:t>
             </a:r>
-            <a:endParaRPr lang="ko-KR" altLang="en-US"/>
           </a:p>
         </p:txBody>
       </p:sp>
@@ -1181,38 +1188,37 @@
           <a:p>
             <a:pPr lvl="0"/>
             <a:r>
-              <a:rPr lang="ko-KR" altLang="en-US" smtClean="0"/>
+              <a:rPr lang="ko-KR" altLang="en-US"/>
               <a:t>마스터 텍스트 스타일을 편집합니다</a:t>
             </a:r>
           </a:p>
           <a:p>
             <a:pPr lvl="1"/>
             <a:r>
-              <a:rPr lang="ko-KR" altLang="en-US" smtClean="0"/>
+              <a:rPr lang="ko-KR" altLang="en-US"/>
               <a:t>둘째 수준</a:t>
             </a:r>
           </a:p>
           <a:p>
             <a:pPr lvl="2"/>
             <a:r>
-              <a:rPr lang="ko-KR" altLang="en-US" smtClean="0"/>
+              <a:rPr lang="ko-KR" altLang="en-US"/>
               <a:t>셋째 수준</a:t>
             </a:r>
           </a:p>
           <a:p>
             <a:pPr lvl="3"/>
             <a:r>
-              <a:rPr lang="ko-KR" altLang="en-US" smtClean="0"/>
+              <a:rPr lang="ko-KR" altLang="en-US"/>
               <a:t>넷째 수준</a:t>
             </a:r>
           </a:p>
           <a:p>
             <a:pPr lvl="4"/>
             <a:r>
-              <a:rPr lang="ko-KR" altLang="en-US" smtClean="0"/>
+              <a:rPr lang="ko-KR" altLang="en-US"/>
               <a:t>다섯째 수준</a:t>
             </a:r>
-            <a:endParaRPr lang="ko-KR" altLang="en-US"/>
           </a:p>
         </p:txBody>
       </p:sp>
@@ -1266,38 +1272,37 @@
           <a:p>
             <a:pPr lvl="0"/>
             <a:r>
-              <a:rPr lang="ko-KR" altLang="en-US" smtClean="0"/>
+              <a:rPr lang="ko-KR" altLang="en-US"/>
               <a:t>마스터 텍스트 스타일을 편집합니다</a:t>
             </a:r>
           </a:p>
           <a:p>
             <a:pPr lvl="1"/>
             <a:r>
-              <a:rPr lang="ko-KR" altLang="en-US" smtClean="0"/>
+              <a:rPr lang="ko-KR" altLang="en-US"/>
               <a:t>둘째 수준</a:t>
             </a:r>
           </a:p>
           <a:p>
             <a:pPr lvl="2"/>
             <a:r>
-              <a:rPr lang="ko-KR" altLang="en-US" smtClean="0"/>
+              <a:rPr lang="ko-KR" altLang="en-US"/>
               <a:t>셋째 수준</a:t>
             </a:r>
           </a:p>
           <a:p>
             <a:pPr lvl="3"/>
             <a:r>
-              <a:rPr lang="ko-KR" altLang="en-US" smtClean="0"/>
+              <a:rPr lang="ko-KR" altLang="en-US"/>
               <a:t>넷째 수준</a:t>
             </a:r>
           </a:p>
           <a:p>
             <a:pPr lvl="4"/>
             <a:r>
-              <a:rPr lang="ko-KR" altLang="en-US" smtClean="0"/>
+              <a:rPr lang="ko-KR" altLang="en-US"/>
               <a:t>다섯째 수준</a:t>
             </a:r>
-            <a:endParaRPr lang="ko-KR" altLang="en-US"/>
           </a:p>
         </p:txBody>
       </p:sp>
@@ -1318,7 +1323,7 @@
           <a:p>
             <a:fld id="{FB30EDBD-1C2D-4C1E-B459-B60219FAB484}" type="datetimeFigureOut">
               <a:rPr lang="ko-KR" altLang="en-US" smtClean="0"/>
-              <a:t>2020-09-23</a:t>
+              <a:t>2020-09-26</a:t>
             </a:fld>
             <a:endParaRPr lang="ko-KR" altLang="en-US"/>
           </a:p>
@@ -1411,10 +1416,9 @@
           </a:lstStyle>
           <a:p>
             <a:r>
-              <a:rPr lang="ko-KR" altLang="en-US" smtClean="0"/>
+              <a:rPr lang="ko-KR" altLang="en-US"/>
               <a:t>마스터 제목 스타일 편집</a:t>
             </a:r>
-            <a:endParaRPr lang="ko-KR" altLang="en-US"/>
           </a:p>
         </p:txBody>
       </p:sp>
@@ -1477,7 +1481,7 @@
           <a:p>
             <a:pPr lvl="0"/>
             <a:r>
-              <a:rPr lang="ko-KR" altLang="en-US" smtClean="0"/>
+              <a:rPr lang="ko-KR" altLang="en-US"/>
               <a:t>마스터 텍스트 스타일을 편집합니다</a:t>
             </a:r>
           </a:p>
@@ -1533,38 +1537,37 @@
           <a:p>
             <a:pPr lvl="0"/>
             <a:r>
-              <a:rPr lang="ko-KR" altLang="en-US" smtClean="0"/>
+              <a:rPr lang="ko-KR" altLang="en-US"/>
               <a:t>마스터 텍스트 스타일을 편집합니다</a:t>
             </a:r>
           </a:p>
           <a:p>
             <a:pPr lvl="1"/>
             <a:r>
-              <a:rPr lang="ko-KR" altLang="en-US" smtClean="0"/>
+              <a:rPr lang="ko-KR" altLang="en-US"/>
               <a:t>둘째 수준</a:t>
             </a:r>
           </a:p>
           <a:p>
             <a:pPr lvl="2"/>
             <a:r>
-              <a:rPr lang="ko-KR" altLang="en-US" smtClean="0"/>
+              <a:rPr lang="ko-KR" altLang="en-US"/>
               <a:t>셋째 수준</a:t>
             </a:r>
           </a:p>
           <a:p>
             <a:pPr lvl="3"/>
             <a:r>
-              <a:rPr lang="ko-KR" altLang="en-US" smtClean="0"/>
+              <a:rPr lang="ko-KR" altLang="en-US"/>
               <a:t>넷째 수준</a:t>
             </a:r>
           </a:p>
           <a:p>
             <a:pPr lvl="4"/>
             <a:r>
-              <a:rPr lang="ko-KR" altLang="en-US" smtClean="0"/>
+              <a:rPr lang="ko-KR" altLang="en-US"/>
               <a:t>다섯째 수준</a:t>
             </a:r>
-            <a:endParaRPr lang="ko-KR" altLang="en-US"/>
           </a:p>
         </p:txBody>
       </p:sp>
@@ -1627,7 +1630,7 @@
           <a:p>
             <a:pPr lvl="0"/>
             <a:r>
-              <a:rPr lang="ko-KR" altLang="en-US" smtClean="0"/>
+              <a:rPr lang="ko-KR" altLang="en-US"/>
               <a:t>마스터 텍스트 스타일을 편집합니다</a:t>
             </a:r>
           </a:p>
@@ -1683,38 +1686,37 @@
           <a:p>
             <a:pPr lvl="0"/>
             <a:r>
-              <a:rPr lang="ko-KR" altLang="en-US" smtClean="0"/>
+              <a:rPr lang="ko-KR" altLang="en-US"/>
               <a:t>마스터 텍스트 스타일을 편집합니다</a:t>
             </a:r>
           </a:p>
           <a:p>
             <a:pPr lvl="1"/>
             <a:r>
-              <a:rPr lang="ko-KR" altLang="en-US" smtClean="0"/>
+              <a:rPr lang="ko-KR" altLang="en-US"/>
               <a:t>둘째 수준</a:t>
             </a:r>
           </a:p>
           <a:p>
             <a:pPr lvl="2"/>
             <a:r>
-              <a:rPr lang="ko-KR" altLang="en-US" smtClean="0"/>
+              <a:rPr lang="ko-KR" altLang="en-US"/>
               <a:t>셋째 수준</a:t>
             </a:r>
           </a:p>
           <a:p>
             <a:pPr lvl="3"/>
             <a:r>
-              <a:rPr lang="ko-KR" altLang="en-US" smtClean="0"/>
+              <a:rPr lang="ko-KR" altLang="en-US"/>
               <a:t>넷째 수준</a:t>
             </a:r>
           </a:p>
           <a:p>
             <a:pPr lvl="4"/>
             <a:r>
-              <a:rPr lang="ko-KR" altLang="en-US" smtClean="0"/>
+              <a:rPr lang="ko-KR" altLang="en-US"/>
               <a:t>다섯째 수준</a:t>
             </a:r>
-            <a:endParaRPr lang="ko-KR" altLang="en-US"/>
           </a:p>
         </p:txBody>
       </p:sp>
@@ -1735,7 +1737,7 @@
           <a:p>
             <a:fld id="{FB30EDBD-1C2D-4C1E-B459-B60219FAB484}" type="datetimeFigureOut">
               <a:rPr lang="ko-KR" altLang="en-US" smtClean="0"/>
-              <a:t>2020-09-23</a:t>
+              <a:t>2020-09-26</a:t>
             </a:fld>
             <a:endParaRPr lang="ko-KR" altLang="en-US"/>
           </a:p>
@@ -1824,10 +1826,9 @@
           <a:lstStyle/>
           <a:p>
             <a:r>
-              <a:rPr lang="ko-KR" altLang="en-US" smtClean="0"/>
+              <a:rPr lang="ko-KR" altLang="en-US"/>
               <a:t>마스터 제목 스타일 편집</a:t>
             </a:r>
-            <a:endParaRPr lang="ko-KR" altLang="en-US"/>
           </a:p>
         </p:txBody>
       </p:sp>
@@ -1848,7 +1849,7 @@
           <a:p>
             <a:fld id="{FB30EDBD-1C2D-4C1E-B459-B60219FAB484}" type="datetimeFigureOut">
               <a:rPr lang="ko-KR" altLang="en-US" smtClean="0"/>
-              <a:t>2020-09-23</a:t>
+              <a:t>2020-09-26</a:t>
             </a:fld>
             <a:endParaRPr lang="ko-KR" altLang="en-US"/>
           </a:p>
@@ -1938,7 +1939,7 @@
           <a:p>
             <a:fld id="{FB30EDBD-1C2D-4C1E-B459-B60219FAB484}" type="datetimeFigureOut">
               <a:rPr lang="ko-KR" altLang="en-US" smtClean="0"/>
-              <a:t>2020-09-23</a:t>
+              <a:t>2020-09-26</a:t>
             </a:fld>
             <a:endParaRPr lang="ko-KR" altLang="en-US"/>
           </a:p>
@@ -2036,10 +2037,9 @@
           </a:lstStyle>
           <a:p>
             <a:r>
-              <a:rPr lang="ko-KR" altLang="en-US" smtClean="0"/>
+              <a:rPr lang="ko-KR" altLang="en-US"/>
               <a:t>마스터 제목 스타일 편집</a:t>
             </a:r>
-            <a:endParaRPr lang="ko-KR" altLang="en-US"/>
           </a:p>
         </p:txBody>
       </p:sp>
@@ -2093,38 +2093,37 @@
           <a:p>
             <a:pPr lvl="0"/>
             <a:r>
-              <a:rPr lang="ko-KR" altLang="en-US" smtClean="0"/>
+              <a:rPr lang="ko-KR" altLang="en-US"/>
               <a:t>마스터 텍스트 스타일을 편집합니다</a:t>
             </a:r>
           </a:p>
           <a:p>
             <a:pPr lvl="1"/>
             <a:r>
-              <a:rPr lang="ko-KR" altLang="en-US" smtClean="0"/>
+              <a:rPr lang="ko-KR" altLang="en-US"/>
               <a:t>둘째 수준</a:t>
             </a:r>
           </a:p>
           <a:p>
             <a:pPr lvl="2"/>
             <a:r>
-              <a:rPr lang="ko-KR" altLang="en-US" smtClean="0"/>
+              <a:rPr lang="ko-KR" altLang="en-US"/>
               <a:t>셋째 수준</a:t>
             </a:r>
           </a:p>
           <a:p>
             <a:pPr lvl="3"/>
             <a:r>
-              <a:rPr lang="ko-KR" altLang="en-US" smtClean="0"/>
+              <a:rPr lang="ko-KR" altLang="en-US"/>
               <a:t>넷째 수준</a:t>
             </a:r>
           </a:p>
           <a:p>
             <a:pPr lvl="4"/>
             <a:r>
-              <a:rPr lang="ko-KR" altLang="en-US" smtClean="0"/>
+              <a:rPr lang="ko-KR" altLang="en-US"/>
               <a:t>다섯째 수준</a:t>
             </a:r>
-            <a:endParaRPr lang="ko-KR" altLang="en-US"/>
           </a:p>
         </p:txBody>
       </p:sp>
@@ -2187,7 +2186,7 @@
           <a:p>
             <a:pPr lvl="0"/>
             <a:r>
-              <a:rPr lang="ko-KR" altLang="en-US" smtClean="0"/>
+              <a:rPr lang="ko-KR" altLang="en-US"/>
               <a:t>마스터 텍스트 스타일을 편집합니다</a:t>
             </a:r>
           </a:p>
@@ -2210,7 +2209,7 @@
           <a:p>
             <a:fld id="{FB30EDBD-1C2D-4C1E-B459-B60219FAB484}" type="datetimeFigureOut">
               <a:rPr lang="ko-KR" altLang="en-US" smtClean="0"/>
-              <a:t>2020-09-23</a:t>
+              <a:t>2020-09-26</a:t>
             </a:fld>
             <a:endParaRPr lang="ko-KR" altLang="en-US"/>
           </a:p>
@@ -2308,10 +2307,9 @@
           </a:lstStyle>
           <a:p>
             <a:r>
-              <a:rPr lang="ko-KR" altLang="en-US" smtClean="0"/>
+              <a:rPr lang="ko-KR" altLang="en-US"/>
               <a:t>마스터 제목 스타일 편집</a:t>
             </a:r>
-            <a:endParaRPr lang="ko-KR" altLang="en-US"/>
           </a:p>
         </p:txBody>
       </p:sp>
@@ -2435,7 +2433,7 @@
           <a:p>
             <a:pPr lvl="0"/>
             <a:r>
-              <a:rPr lang="ko-KR" altLang="en-US" smtClean="0"/>
+              <a:rPr lang="ko-KR" altLang="en-US"/>
               <a:t>마스터 텍스트 스타일을 편집합니다</a:t>
             </a:r>
           </a:p>
@@ -2458,7 +2456,7 @@
           <a:p>
             <a:fld id="{FB30EDBD-1C2D-4C1E-B459-B60219FAB484}" type="datetimeFigureOut">
               <a:rPr lang="ko-KR" altLang="en-US" smtClean="0"/>
-              <a:t>2020-09-23</a:t>
+              <a:t>2020-09-26</a:t>
             </a:fld>
             <a:endParaRPr lang="ko-KR" altLang="en-US"/>
           </a:p>
@@ -2562,10 +2560,9 @@
           <a:lstStyle/>
           <a:p>
             <a:r>
-              <a:rPr lang="ko-KR" altLang="en-US" smtClean="0"/>
+              <a:rPr lang="ko-KR" altLang="en-US"/>
               <a:t>마스터 제목 스타일 편집</a:t>
             </a:r>
-            <a:endParaRPr lang="ko-KR" altLang="en-US"/>
           </a:p>
         </p:txBody>
       </p:sp>
@@ -2596,38 +2593,37 @@
           <a:p>
             <a:pPr lvl="0"/>
             <a:r>
-              <a:rPr lang="ko-KR" altLang="en-US" smtClean="0"/>
+              <a:rPr lang="ko-KR" altLang="en-US"/>
               <a:t>마스터 텍스트 스타일을 편집합니다</a:t>
             </a:r>
           </a:p>
           <a:p>
             <a:pPr lvl="1"/>
             <a:r>
-              <a:rPr lang="ko-KR" altLang="en-US" smtClean="0"/>
+              <a:rPr lang="ko-KR" altLang="en-US"/>
               <a:t>둘째 수준</a:t>
             </a:r>
           </a:p>
           <a:p>
             <a:pPr lvl="2"/>
             <a:r>
-              <a:rPr lang="ko-KR" altLang="en-US" smtClean="0"/>
+              <a:rPr lang="ko-KR" altLang="en-US"/>
               <a:t>셋째 수준</a:t>
             </a:r>
           </a:p>
           <a:p>
             <a:pPr lvl="3"/>
             <a:r>
-              <a:rPr lang="ko-KR" altLang="en-US" smtClean="0"/>
+              <a:rPr lang="ko-KR" altLang="en-US"/>
               <a:t>넷째 수준</a:t>
             </a:r>
           </a:p>
           <a:p>
             <a:pPr lvl="4"/>
             <a:r>
-              <a:rPr lang="ko-KR" altLang="en-US" smtClean="0"/>
+              <a:rPr lang="ko-KR" altLang="en-US"/>
               <a:t>다섯째 수준</a:t>
             </a:r>
-            <a:endParaRPr lang="ko-KR" altLang="en-US"/>
           </a:p>
         </p:txBody>
       </p:sp>
@@ -2666,7 +2662,7 @@
           <a:p>
             <a:fld id="{FB30EDBD-1C2D-4C1E-B459-B60219FAB484}" type="datetimeFigureOut">
               <a:rPr lang="ko-KR" altLang="en-US" smtClean="0"/>
-              <a:t>2020-09-23</a:t>
+              <a:t>2020-09-26</a:t>
             </a:fld>
             <a:endParaRPr lang="ko-KR" altLang="en-US"/>
           </a:p>
@@ -3132,6 +3128,66 @@
       </p:grpSpPr>
       <p:pic>
         <p:nvPicPr>
+          <p:cNvPr id="5" name="그림 4">
+            <a:extLst>
+              <a:ext uri="{FF2B5EF4-FFF2-40B4-BE49-F238E27FC236}">
+                <a16:creationId xmlns:a16="http://schemas.microsoft.com/office/drawing/2014/main" id="{E897F1E8-42BD-4924-8DB5-8236D4BE5E87}"/>
+              </a:ext>
+            </a:extLst>
+          </p:cNvPr>
+          <p:cNvPicPr>
+            <a:picLocks noChangeAspect="1"/>
+          </p:cNvPicPr>
+          <p:nvPr/>
+        </p:nvPicPr>
+        <p:blipFill>
+          <a:blip r:embed="rId2"/>
+          <a:stretch>
+            <a:fillRect/>
+          </a:stretch>
+        </p:blipFill>
+        <p:spPr>
+          <a:xfrm>
+            <a:off x="1900620" y="1433512"/>
+            <a:ext cx="5342760" cy="3990976"/>
+          </a:xfrm>
+          <a:prstGeom prst="rect">
+            <a:avLst/>
+          </a:prstGeom>
+        </p:spPr>
+      </p:pic>
+    </p:spTree>
+    <p:extLst>
+      <p:ext uri="{BB962C8B-B14F-4D97-AF65-F5344CB8AC3E}">
+        <p14:creationId xmlns:p14="http://schemas.microsoft.com/office/powerpoint/2010/main" val="1071541860"/>
+      </p:ext>
+    </p:extLst>
+  </p:cSld>
+  <p:clrMapOvr>
+    <a:masterClrMapping/>
+  </p:clrMapOvr>
+</p:sld>
+</file>
+
+<file path=ppt/slides/slide3.xml><?xml version="1.0" encoding="utf-8"?>
+<p:sld xmlns:a="http://schemas.openxmlformats.org/drawingml/2006/main" xmlns:r="http://schemas.openxmlformats.org/officeDocument/2006/relationships" xmlns:p="http://schemas.openxmlformats.org/presentationml/2006/main">
+  <p:cSld>
+    <p:spTree>
+      <p:nvGrpSpPr>
+        <p:cNvPr id="1" name=""/>
+        <p:cNvGrpSpPr/>
+        <p:nvPr/>
+      </p:nvGrpSpPr>
+      <p:grpSpPr>
+        <a:xfrm>
+          <a:off x="0" y="0"/>
+          <a:ext cx="0" cy="0"/>
+          <a:chOff x="0" y="0"/>
+          <a:chExt cx="0" cy="0"/>
+        </a:xfrm>
+      </p:grpSpPr>
+      <p:pic>
+        <p:nvPicPr>
           <p:cNvPr id="1026" name="Picture 2"/>
           <p:cNvPicPr>
             <a:picLocks noChangeAspect="1" noChangeArrowheads="1"/>

</xml_diff>